<commit_message>
resubmitting again (final this time? not clickbait)
</commit_message>
<xml_diff>
--- a/forwardModel/BKA-results/data-model-resids/Cont/contBKA-gallery.pptx
+++ b/forwardModel/BKA-results/data-model-resids/Cont/contBKA-gallery.pptx
@@ -197,7 +197,7 @@
           <a:p>
             <a:fld id="{08C121A9-109E-EB46-8716-F9E8805ED9E7}" type="datetimeFigureOut">
               <a:rPr lang="en-US" smtClean="0"/>
-              <a:t>1/11/22</a:t>
+              <a:t>5/24/22</a:t>
             </a:fld>
             <a:endParaRPr lang="en-US"/>
           </a:p>
@@ -679,7 +679,7 @@
           <a:p>
             <a:fld id="{92FBD9D3-FD56-2445-B4E5-1DB60E749807}" type="datetimeFigureOut">
               <a:rPr lang="en-US" smtClean="0"/>
-              <a:t>1/11/22</a:t>
+              <a:t>5/24/22</a:t>
             </a:fld>
             <a:endParaRPr lang="en-US"/>
           </a:p>
@@ -849,7 +849,7 @@
           <a:p>
             <a:fld id="{92FBD9D3-FD56-2445-B4E5-1DB60E749807}" type="datetimeFigureOut">
               <a:rPr lang="en-US" smtClean="0"/>
-              <a:t>1/11/22</a:t>
+              <a:t>5/24/22</a:t>
             </a:fld>
             <a:endParaRPr lang="en-US"/>
           </a:p>
@@ -1029,7 +1029,7 @@
           <a:p>
             <a:fld id="{92FBD9D3-FD56-2445-B4E5-1DB60E749807}" type="datetimeFigureOut">
               <a:rPr lang="en-US" smtClean="0"/>
-              <a:t>1/11/22</a:t>
+              <a:t>5/24/22</a:t>
             </a:fld>
             <a:endParaRPr lang="en-US"/>
           </a:p>
@@ -1199,7 +1199,7 @@
           <a:p>
             <a:fld id="{92FBD9D3-FD56-2445-B4E5-1DB60E749807}" type="datetimeFigureOut">
               <a:rPr lang="en-US" smtClean="0"/>
-              <a:t>1/11/22</a:t>
+              <a:t>5/24/22</a:t>
             </a:fld>
             <a:endParaRPr lang="en-US"/>
           </a:p>
@@ -1443,7 +1443,7 @@
           <a:p>
             <a:fld id="{92FBD9D3-FD56-2445-B4E5-1DB60E749807}" type="datetimeFigureOut">
               <a:rPr lang="en-US" smtClean="0"/>
-              <a:t>1/11/22</a:t>
+              <a:t>5/24/22</a:t>
             </a:fld>
             <a:endParaRPr lang="en-US"/>
           </a:p>
@@ -1675,7 +1675,7 @@
           <a:p>
             <a:fld id="{92FBD9D3-FD56-2445-B4E5-1DB60E749807}" type="datetimeFigureOut">
               <a:rPr lang="en-US" smtClean="0"/>
-              <a:t>1/11/22</a:t>
+              <a:t>5/24/22</a:t>
             </a:fld>
             <a:endParaRPr lang="en-US"/>
           </a:p>
@@ -2042,7 +2042,7 @@
           <a:p>
             <a:fld id="{92FBD9D3-FD56-2445-B4E5-1DB60E749807}" type="datetimeFigureOut">
               <a:rPr lang="en-US" smtClean="0"/>
-              <a:t>1/11/22</a:t>
+              <a:t>5/24/22</a:t>
             </a:fld>
             <a:endParaRPr lang="en-US"/>
           </a:p>
@@ -2160,7 +2160,7 @@
           <a:p>
             <a:fld id="{92FBD9D3-FD56-2445-B4E5-1DB60E749807}" type="datetimeFigureOut">
               <a:rPr lang="en-US" smtClean="0"/>
-              <a:t>1/11/22</a:t>
+              <a:t>5/24/22</a:t>
             </a:fld>
             <a:endParaRPr lang="en-US"/>
           </a:p>
@@ -2255,7 +2255,7 @@
           <a:p>
             <a:fld id="{92FBD9D3-FD56-2445-B4E5-1DB60E749807}" type="datetimeFigureOut">
               <a:rPr lang="en-US" smtClean="0"/>
-              <a:t>1/11/22</a:t>
+              <a:t>5/24/22</a:t>
             </a:fld>
             <a:endParaRPr lang="en-US"/>
           </a:p>
@@ -2532,7 +2532,7 @@
           <a:p>
             <a:fld id="{92FBD9D3-FD56-2445-B4E5-1DB60E749807}" type="datetimeFigureOut">
               <a:rPr lang="en-US" smtClean="0"/>
-              <a:t>1/11/22</a:t>
+              <a:t>5/24/22</a:t>
             </a:fld>
             <a:endParaRPr lang="en-US"/>
           </a:p>
@@ -2789,7 +2789,7 @@
           <a:p>
             <a:fld id="{92FBD9D3-FD56-2445-B4E5-1DB60E749807}" type="datetimeFigureOut">
               <a:rPr lang="en-US" smtClean="0"/>
-              <a:t>1/11/22</a:t>
+              <a:t>5/24/22</a:t>
             </a:fld>
             <a:endParaRPr lang="en-US"/>
           </a:p>
@@ -3002,7 +3002,7 @@
           <a:p>
             <a:fld id="{92FBD9D3-FD56-2445-B4E5-1DB60E749807}" type="datetimeFigureOut">
               <a:rPr lang="en-US" smtClean="0"/>
-              <a:t>1/11/22</a:t>
+              <a:t>5/24/22</a:t>
             </a:fld>
             <a:endParaRPr lang="en-US"/>
           </a:p>
@@ -4826,6 +4826,240 @@
           <a:p>
             <a:pPr algn="ctr"/>
             <a:endParaRPr lang="en-US"/>
+          </a:p>
+        </p:txBody>
+      </p:sp>
+      <p:sp>
+        <p:nvSpPr>
+          <p:cNvPr id="38" name="TextBox 37">
+            <a:extLst>
+              <a:ext uri="{FF2B5EF4-FFF2-40B4-BE49-F238E27FC236}">
+                <a16:creationId xmlns:a16="http://schemas.microsoft.com/office/drawing/2014/main" id="{DDF06D99-B8C0-C831-FB77-1A8CD21BD258}"/>
+              </a:ext>
+            </a:extLst>
+          </p:cNvPr>
+          <p:cNvSpPr txBox="1"/>
+          <p:nvPr/>
+        </p:nvSpPr>
+        <p:spPr>
+          <a:xfrm rot="16200000">
+            <a:off x="-605775" y="952955"/>
+            <a:ext cx="1439818" cy="369332"/>
+          </a:xfrm>
+          <a:prstGeom prst="rect">
+            <a:avLst/>
+          </a:prstGeom>
+          <a:noFill/>
+        </p:spPr>
+        <p:txBody>
+          <a:bodyPr wrap="none" rtlCol="0">
+            <a:spAutoFit/>
+          </a:bodyPr>
+          <a:lstStyle/>
+          <a:p>
+            <a:r>
+              <a:rPr lang="en-US" dirty="0">
+                <a:latin typeface="DEJAVU SANS MONO" panose="020B0609030804020204" pitchFamily="49" charset="0"/>
+                <a:ea typeface="DEJAVU SANS MONO" panose="020B0609030804020204" pitchFamily="49" charset="0"/>
+                <a:cs typeface="DEJAVU SANS MONO" panose="020B0609030804020204" pitchFamily="49" charset="0"/>
+              </a:rPr>
+              <a:t>11 Apr 13</a:t>
+            </a:r>
+          </a:p>
+        </p:txBody>
+      </p:sp>
+      <p:sp>
+        <p:nvSpPr>
+          <p:cNvPr id="39" name="TextBox 38">
+            <a:extLst>
+              <a:ext uri="{FF2B5EF4-FFF2-40B4-BE49-F238E27FC236}">
+                <a16:creationId xmlns:a16="http://schemas.microsoft.com/office/drawing/2014/main" id="{6466E463-004B-DFB3-03D3-6F6D085842AE}"/>
+              </a:ext>
+            </a:extLst>
+          </p:cNvPr>
+          <p:cNvSpPr txBox="1"/>
+          <p:nvPr/>
+        </p:nvSpPr>
+        <p:spPr>
+          <a:xfrm rot="16200000">
+            <a:off x="-518520" y="3238955"/>
+            <a:ext cx="1300356" cy="369332"/>
+          </a:xfrm>
+          <a:prstGeom prst="rect">
+            <a:avLst/>
+          </a:prstGeom>
+          <a:noFill/>
+        </p:spPr>
+        <p:txBody>
+          <a:bodyPr wrap="none" rtlCol="0">
+            <a:spAutoFit/>
+          </a:bodyPr>
+          <a:lstStyle/>
+          <a:p>
+            <a:r>
+              <a:rPr lang="en-US" dirty="0">
+                <a:latin typeface="DEJAVU SANS MONO" panose="020B0609030804020204" pitchFamily="49" charset="0"/>
+                <a:ea typeface="DEJAVU SANS MONO" panose="020B0609030804020204" pitchFamily="49" charset="0"/>
+                <a:cs typeface="DEJAVU SANS MONO" panose="020B0609030804020204" pitchFamily="49" charset="0"/>
+              </a:rPr>
+              <a:t>8 Apr 14</a:t>
+            </a:r>
+          </a:p>
+        </p:txBody>
+      </p:sp>
+      <p:sp>
+        <p:nvSpPr>
+          <p:cNvPr id="40" name="TextBox 39">
+            <a:extLst>
+              <a:ext uri="{FF2B5EF4-FFF2-40B4-BE49-F238E27FC236}">
+                <a16:creationId xmlns:a16="http://schemas.microsoft.com/office/drawing/2014/main" id="{BD96DFB5-3603-6B12-4AA7-1CF34C27D1C4}"/>
+              </a:ext>
+            </a:extLst>
+          </p:cNvPr>
+          <p:cNvSpPr txBox="1"/>
+          <p:nvPr/>
+        </p:nvSpPr>
+        <p:spPr>
+          <a:xfrm rot="16200000">
+            <a:off x="-588251" y="5524955"/>
+            <a:ext cx="1439818" cy="369332"/>
+          </a:xfrm>
+          <a:prstGeom prst="rect">
+            <a:avLst/>
+          </a:prstGeom>
+          <a:noFill/>
+        </p:spPr>
+        <p:txBody>
+          <a:bodyPr wrap="none" rtlCol="0">
+            <a:spAutoFit/>
+          </a:bodyPr>
+          <a:lstStyle/>
+          <a:p>
+            <a:r>
+              <a:rPr lang="en-US" dirty="0">
+                <a:latin typeface="DEJAVU SANS MONO" panose="020B0609030804020204" pitchFamily="49" charset="0"/>
+                <a:ea typeface="DEJAVU SANS MONO" panose="020B0609030804020204" pitchFamily="49" charset="0"/>
+                <a:cs typeface="DEJAVU SANS MONO" panose="020B0609030804020204" pitchFamily="49" charset="0"/>
+              </a:rPr>
+              <a:t>15 May 15</a:t>
+            </a:r>
+          </a:p>
+        </p:txBody>
+      </p:sp>
+      <p:sp>
+        <p:nvSpPr>
+          <p:cNvPr id="41" name="TextBox 40">
+            <a:extLst>
+              <a:ext uri="{FF2B5EF4-FFF2-40B4-BE49-F238E27FC236}">
+                <a16:creationId xmlns:a16="http://schemas.microsoft.com/office/drawing/2014/main" id="{360C4DC0-199B-C1E2-0F34-98BB530EBE72}"/>
+              </a:ext>
+            </a:extLst>
+          </p:cNvPr>
+          <p:cNvSpPr txBox="1"/>
+          <p:nvPr/>
+        </p:nvSpPr>
+        <p:spPr>
+          <a:xfrm rot="16200000">
+            <a:off x="-588251" y="7810955"/>
+            <a:ext cx="1439818" cy="369332"/>
+          </a:xfrm>
+          <a:prstGeom prst="rect">
+            <a:avLst/>
+          </a:prstGeom>
+          <a:noFill/>
+        </p:spPr>
+        <p:txBody>
+          <a:bodyPr wrap="none" rtlCol="0">
+            <a:spAutoFit/>
+          </a:bodyPr>
+          <a:lstStyle/>
+          <a:p>
+            <a:r>
+              <a:rPr lang="en-US" dirty="0">
+                <a:latin typeface="DEJAVU SANS MONO" panose="020B0609030804020204" pitchFamily="49" charset="0"/>
+                <a:ea typeface="DEJAVU SANS MONO" panose="020B0609030804020204" pitchFamily="49" charset="0"/>
+                <a:cs typeface="DEJAVU SANS MONO" panose="020B0609030804020204" pitchFamily="49" charset="0"/>
+              </a:rPr>
+              <a:t>16 May 15</a:t>
+            </a:r>
+          </a:p>
+        </p:txBody>
+      </p:sp>
+      <p:sp>
+        <p:nvSpPr>
+          <p:cNvPr id="42" name="TextBox 41">
+            <a:extLst>
+              <a:ext uri="{FF2B5EF4-FFF2-40B4-BE49-F238E27FC236}">
+                <a16:creationId xmlns:a16="http://schemas.microsoft.com/office/drawing/2014/main" id="{46748432-BBCF-4289-E82C-AED9EFCF900D}"/>
+              </a:ext>
+            </a:extLst>
+          </p:cNvPr>
+          <p:cNvSpPr txBox="1"/>
+          <p:nvPr/>
+        </p:nvSpPr>
+        <p:spPr>
+          <a:xfrm rot="16200000">
+            <a:off x="-535242" y="10118473"/>
+            <a:ext cx="1439818" cy="369332"/>
+          </a:xfrm>
+          <a:prstGeom prst="rect">
+            <a:avLst/>
+          </a:prstGeom>
+          <a:noFill/>
+        </p:spPr>
+        <p:txBody>
+          <a:bodyPr wrap="none" rtlCol="0">
+            <a:spAutoFit/>
+          </a:bodyPr>
+          <a:lstStyle/>
+          <a:p>
+            <a:r>
+              <a:rPr lang="en-US" dirty="0">
+                <a:latin typeface="DEJAVU SANS MONO" panose="020B0609030804020204" pitchFamily="49" charset="0"/>
+                <a:ea typeface="DEJAVU SANS MONO" panose="020B0609030804020204" pitchFamily="49" charset="0"/>
+                <a:cs typeface="DEJAVU SANS MONO" panose="020B0609030804020204" pitchFamily="49" charset="0"/>
+              </a:rPr>
+              <a:t>18 May 15</a:t>
+            </a:r>
+          </a:p>
+        </p:txBody>
+      </p:sp>
+      <p:sp>
+        <p:nvSpPr>
+          <p:cNvPr id="43" name="TextBox 42">
+            <a:extLst>
+              <a:ext uri="{FF2B5EF4-FFF2-40B4-BE49-F238E27FC236}">
+                <a16:creationId xmlns:a16="http://schemas.microsoft.com/office/drawing/2014/main" id="{8781DD59-972E-41B4-10D5-9323630CEE90}"/>
+              </a:ext>
+            </a:extLst>
+          </p:cNvPr>
+          <p:cNvSpPr txBox="1"/>
+          <p:nvPr/>
+        </p:nvSpPr>
+        <p:spPr>
+          <a:xfrm rot="16200000">
+            <a:off x="-535242" y="12404473"/>
+            <a:ext cx="1439818" cy="369332"/>
+          </a:xfrm>
+          <a:prstGeom prst="rect">
+            <a:avLst/>
+          </a:prstGeom>
+          <a:noFill/>
+        </p:spPr>
+        <p:txBody>
+          <a:bodyPr wrap="none" rtlCol="0">
+            <a:spAutoFit/>
+          </a:bodyPr>
+          <a:lstStyle/>
+          <a:p>
+            <a:r>
+              <a:rPr lang="en-US" dirty="0">
+                <a:latin typeface="DEJAVU SANS MONO" panose="020B0609030804020204" pitchFamily="49" charset="0"/>
+                <a:ea typeface="DEJAVU SANS MONO" panose="020B0609030804020204" pitchFamily="49" charset="0"/>
+                <a:cs typeface="DEJAVU SANS MONO" panose="020B0609030804020204" pitchFamily="49" charset="0"/>
+              </a:rPr>
+              <a:t>27 Apr 18</a:t>
+            </a:r>
           </a:p>
         </p:txBody>
       </p:sp>

</xml_diff>